<commit_message>
improve of ppt and txt documents
</commit_message>
<xml_diff>
--- a/pvt/pvt.pptx
+++ b/pvt/pvt.pptx
@@ -13602,7 +13602,7 @@
         </p:nvSpPr>
         <p:spPr>
           <a:xfrm>
-            <a:off x="8711699" y="2720862"/>
+            <a:off x="8142577" y="839423"/>
             <a:ext cx="1567543" cy="646331"/>
           </a:xfrm>
           <a:prstGeom prst="rect">
@@ -13637,8 +13637,8 @@
         </p:nvSpPr>
         <p:spPr>
           <a:xfrm>
-            <a:off x="8073307" y="3475413"/>
-            <a:ext cx="3762103" cy="1477328"/>
+            <a:off x="7171604" y="1558632"/>
+            <a:ext cx="4520210" cy="2585323"/>
           </a:xfrm>
           <a:prstGeom prst="rect">
             <a:avLst/>
@@ -13663,6 +13663,23 @@
               <a:rPr lang="fr-FR" dirty="0"/>
               <a:t>, est une technologie permettant d’échanger des données entre un lecteur et n’importe quel terminal mobile compatible.</a:t>
             </a:r>
+          </a:p>
+          <a:p>
+            <a:r>
+              <a:rPr lang="fr-FR" dirty="0"/>
+              <a:t>Il existe de nombreux Tags NFC différents par leur forme, taille mémoire, distance effective,… Ainsi que plusieurs </a:t>
+            </a:r>
+            <a:r>
+              <a:rPr lang="fr-FR" dirty="0" err="1"/>
+              <a:t>frameworks</a:t>
+            </a:r>
+            <a:r>
+              <a:rPr lang="fr-FR" dirty="0"/>
+              <a:t> de développement pour les applications mobiles.</a:t>
+            </a:r>
+          </a:p>
+          <a:p>
+            <a:endParaRPr lang="fr-FR" dirty="0"/>
           </a:p>
         </p:txBody>
       </p:sp>
@@ -13975,6 +13992,42 @@
           </a:p>
         </p:txBody>
       </p:sp>
+      <p:pic>
+        <p:nvPicPr>
+          <p:cNvPr id="8" name="Image 7" descr="Une image contenant texte, périphérique, horloge&#10;&#10;Description générée automatiquement">
+            <a:extLst>
+              <a:ext uri="{FF2B5EF4-FFF2-40B4-BE49-F238E27FC236}">
+                <a16:creationId xmlns:a16="http://schemas.microsoft.com/office/drawing/2014/main" id="{BFD081AC-3E49-C548-CE8E-859356C3FA78}"/>
+              </a:ext>
+            </a:extLst>
+          </p:cNvPr>
+          <p:cNvPicPr>
+            <a:picLocks noChangeAspect="1"/>
+          </p:cNvPicPr>
+          <p:nvPr/>
+        </p:nvPicPr>
+        <p:blipFill>
+          <a:blip r:embed="rId7">
+            <a:extLst>
+              <a:ext uri="{28A0092B-C50C-407E-A947-70E740481C1C}">
+                <a14:useLocalDpi xmlns:a14="http://schemas.microsoft.com/office/drawing/2010/main" val="0"/>
+              </a:ext>
+            </a:extLst>
+          </a:blip>
+          <a:stretch>
+            <a:fillRect/>
+          </a:stretch>
+        </p:blipFill>
+        <p:spPr>
+          <a:xfrm>
+            <a:off x="7471015" y="3811819"/>
+            <a:ext cx="4699000" cy="1231900"/>
+          </a:xfrm>
+          <a:prstGeom prst="rect">
+            <a:avLst/>
+          </a:prstGeom>
+        </p:spPr>
+      </p:pic>
     </p:spTree>
     <p:extLst>
       <p:ext uri="{BB962C8B-B14F-4D97-AF65-F5344CB8AC3E}">
@@ -16716,6 +16769,135 @@
           </p:txBody>
         </p:sp>
       </p:grpSp>
+      <p:sp>
+        <p:nvSpPr>
+          <p:cNvPr id="5" name="ZoneTexte 4">
+            <a:extLst>
+              <a:ext uri="{FF2B5EF4-FFF2-40B4-BE49-F238E27FC236}">
+                <a16:creationId xmlns:a16="http://schemas.microsoft.com/office/drawing/2014/main" id="{7A3D75A3-C9E1-EEFC-229A-827625B7BAD2}"/>
+              </a:ext>
+            </a:extLst>
+          </p:cNvPr>
+          <p:cNvSpPr txBox="1"/>
+          <p:nvPr/>
+        </p:nvSpPr>
+        <p:spPr>
+          <a:xfrm>
+            <a:off x="583096" y="5817704"/>
+            <a:ext cx="6109252" cy="369332"/>
+          </a:xfrm>
+          <a:prstGeom prst="rect">
+            <a:avLst/>
+          </a:prstGeom>
+          <a:noFill/>
+        </p:spPr>
+        <p:txBody>
+          <a:bodyPr wrap="square" rtlCol="0">
+            <a:spAutoFit/>
+          </a:bodyPr>
+          <a:lstStyle/>
+          <a:p>
+            <a:r>
+              <a:rPr lang="fr-FR" dirty="0"/>
+              <a:t>https://</a:t>
+            </a:r>
+            <a:r>
+              <a:rPr lang="fr-FR" dirty="0" err="1"/>
+              <a:t>blog.steamulo.com</a:t>
+            </a:r>
+            <a:r>
+              <a:rPr lang="fr-FR" dirty="0"/>
+              <a:t>/</a:t>
+            </a:r>
+          </a:p>
+        </p:txBody>
+      </p:sp>
+      <p:sp>
+        <p:nvSpPr>
+          <p:cNvPr id="6" name="ZoneTexte 5">
+            <a:extLst>
+              <a:ext uri="{FF2B5EF4-FFF2-40B4-BE49-F238E27FC236}">
+                <a16:creationId xmlns:a16="http://schemas.microsoft.com/office/drawing/2014/main" id="{C1277FD0-6031-4048-2499-4A9D4475DF01}"/>
+              </a:ext>
+            </a:extLst>
+          </p:cNvPr>
+          <p:cNvSpPr txBox="1"/>
+          <p:nvPr/>
+        </p:nvSpPr>
+        <p:spPr>
+          <a:xfrm>
+            <a:off x="708991" y="6267416"/>
+            <a:ext cx="6109252" cy="923330"/>
+          </a:xfrm>
+          <a:prstGeom prst="rect">
+            <a:avLst/>
+          </a:prstGeom>
+          <a:noFill/>
+        </p:spPr>
+        <p:txBody>
+          <a:bodyPr wrap="square" rtlCol="0">
+            <a:spAutoFit/>
+          </a:bodyPr>
+          <a:lstStyle/>
+          <a:p>
+            <a:r>
+              <a:rPr lang="fr-FR" dirty="0"/>
+              <a:t>https://</a:t>
+            </a:r>
+            <a:r>
+              <a:rPr lang="fr-FR" dirty="0" err="1"/>
+              <a:t>www.netcost-security.fr</a:t>
+            </a:r>
+            <a:r>
+              <a:rPr lang="fr-FR" dirty="0"/>
+              <a:t>/</a:t>
+            </a:r>
+            <a:r>
+              <a:rPr lang="fr-FR" dirty="0" err="1"/>
+              <a:t>mobilite</a:t>
+            </a:r>
+            <a:r>
+              <a:rPr lang="fr-FR" dirty="0"/>
+              <a:t>/107693/letiquette-de-sac-a-encre-electronique-dalaska-airlines-sassocie-a-votre-iphone-pour-creer-une-etiquette-de-bagage-electronique/</a:t>
+            </a:r>
+          </a:p>
+        </p:txBody>
+      </p:sp>
+      <p:sp>
+        <p:nvSpPr>
+          <p:cNvPr id="7" name="ZoneTexte 6">
+            <a:extLst>
+              <a:ext uri="{FF2B5EF4-FFF2-40B4-BE49-F238E27FC236}">
+                <a16:creationId xmlns:a16="http://schemas.microsoft.com/office/drawing/2014/main" id="{4D0CDB6E-C13C-5EEE-68D3-6F9886FE619C}"/>
+              </a:ext>
+            </a:extLst>
+          </p:cNvPr>
+          <p:cNvSpPr txBox="1"/>
+          <p:nvPr/>
+        </p:nvSpPr>
+        <p:spPr>
+          <a:xfrm>
+            <a:off x="808383" y="5189100"/>
+            <a:ext cx="2478156" cy="400110"/>
+          </a:xfrm>
+          <a:prstGeom prst="rect">
+            <a:avLst/>
+          </a:prstGeom>
+          <a:noFill/>
+        </p:spPr>
+        <p:txBody>
+          <a:bodyPr wrap="square" rtlCol="0">
+            <a:spAutoFit/>
+          </a:bodyPr>
+          <a:lstStyle/>
+          <a:p>
+            <a:r>
+              <a:rPr lang="fr-FR" sz="2000" b="1" dirty="0"/>
+              <a:t>Sources:</a:t>
+            </a:r>
+          </a:p>
+        </p:txBody>
+      </p:sp>
     </p:spTree>
     <p:extLst>
       <p:ext uri="{BB962C8B-B14F-4D97-AF65-F5344CB8AC3E}">

</xml_diff>